<commit_message>
3 add to remove annoations
</commit_message>
<xml_diff>
--- a/Presentation.pptx
+++ b/Presentation.pptx
@@ -6036,13 +6036,8 @@
             <a:pPr lvl="1"/>
             <a:r>
               <a:rPr lang="en-US" dirty="0"/>
-              <a:t>Example: </a:t>
-            </a:r>
-            <a:r>
-              <a:rPr lang="en-US"/>
-              <a:t>Bitwise arguments</a:t>
-            </a:r>
-            <a:endParaRPr lang="en-US" dirty="0"/>
+              <a:t>Example: Bitwise arguments</a:t>
+            </a:r>
           </a:p>
           <a:p>
             <a:r>
@@ -6419,7 +6414,30 @@
           <a:bodyPr/>
           <a:lstStyle/>
           <a:p>
-            <a:endParaRPr lang="en-US"/>
+            <a:endParaRPr lang="en-US" dirty="0"/>
+          </a:p>
+          <a:p>
+            <a:endParaRPr lang="en-US" dirty="0"/>
+          </a:p>
+          <a:p>
+            <a:r>
+              <a:rPr lang="en-US" dirty="0"/>
+              <a:t>For loops</a:t>
+            </a:r>
+          </a:p>
+          <a:p>
+            <a:pPr lvl="1"/>
+            <a:r>
+              <a:rPr lang="en-US" dirty="0"/>
+              <a:t>Exposed to optimizations</a:t>
+            </a:r>
+          </a:p>
+          <a:p>
+            <a:pPr lvl="1"/>
+            <a:r>
+              <a:rPr lang="en-US" dirty="0"/>
+              <a:t>Range issues</a:t>
+            </a:r>
           </a:p>
         </p:txBody>
       </p:sp>
@@ -6556,7 +6574,59 @@
           <a:bodyPr/>
           <a:lstStyle/>
           <a:p>
-            <a:endParaRPr lang="en-US"/>
+            <a:endParaRPr lang="en-US" dirty="0"/>
+          </a:p>
+          <a:p>
+            <a:r>
+              <a:rPr lang="en-US" dirty="0"/>
+              <a:t>Julia standard functions</a:t>
+            </a:r>
+          </a:p>
+          <a:p>
+            <a:r>
+              <a:rPr lang="en-US" dirty="0"/>
+              <a:t>Self declared functions</a:t>
+            </a:r>
+          </a:p>
+          <a:p>
+            <a:r>
+              <a:rPr lang="en-US" dirty="0"/>
+              <a:t>Function use in expressions</a:t>
+            </a:r>
+          </a:p>
+          <a:p>
+            <a:r>
+              <a:rPr lang="en-US" dirty="0"/>
+              <a:t>State stores:</a:t>
+            </a:r>
+          </a:p>
+          <a:p>
+            <a:pPr lvl="1"/>
+            <a:r>
+              <a:rPr lang="en-US" dirty="0"/>
+              <a:t>Type (e.g. Integer)</a:t>
+            </a:r>
+          </a:p>
+          <a:p>
+            <a:pPr lvl="1"/>
+            <a:r>
+              <a:rPr lang="en-US" dirty="0"/>
+              <a:t>Scope number</a:t>
+            </a:r>
+          </a:p>
+          <a:p>
+            <a:pPr lvl="1"/>
+            <a:r>
+              <a:rPr lang="en-US" dirty="0"/>
+              <a:t>Id (e.g. var_23)</a:t>
+            </a:r>
+          </a:p>
+          <a:p>
+            <a:pPr lvl="1"/>
+            <a:r>
+              <a:rPr lang="en-US" dirty="0"/>
+              <a:t>Argument types (e.g. [Integer, Float, Integer])</a:t>
+            </a:r>
           </a:p>
         </p:txBody>
       </p:sp>
@@ -6974,25 +7044,6 @@
       </p:sp>
       <p:sp>
         <p:nvSpPr>
-          <p:cNvPr id="3" name="Content Placeholder 2"/>
-          <p:cNvSpPr>
-            <a:spLocks noGrp="1"/>
-          </p:cNvSpPr>
-          <p:nvPr>
-            <p:ph idx="1"/>
-          </p:nvPr>
-        </p:nvSpPr>
-        <p:spPr/>
-        <p:txBody>
-          <a:bodyPr/>
-          <a:lstStyle/>
-          <a:p>
-            <a:endParaRPr lang="en-US"/>
-          </a:p>
-        </p:txBody>
-      </p:sp>
-      <p:sp>
-        <p:nvSpPr>
           <p:cNvPr id="10" name="Text Placeholder 3">
             <a:extLst>
               <a:ext uri="{FF2B5EF4-FFF2-40B4-BE49-F238E27FC236}">
@@ -7053,6 +7104,274 @@
             <a:r>
               <a:rPr lang="en-US"/>
               <a:t>26 June 2020</a:t>
+            </a:r>
+          </a:p>
+        </p:txBody>
+      </p:sp>
+      <p:pic>
+        <p:nvPicPr>
+          <p:cNvPr id="5" name="Picture 4">
+            <a:extLst>
+              <a:ext uri="{FF2B5EF4-FFF2-40B4-BE49-F238E27FC236}">
+                <a16:creationId xmlns:a16="http://schemas.microsoft.com/office/drawing/2014/main" id="{BDB1A222-DF07-C64E-A263-C30389867532}"/>
+              </a:ext>
+            </a:extLst>
+          </p:cNvPr>
+          <p:cNvPicPr>
+            <a:picLocks noChangeAspect="1"/>
+          </p:cNvPicPr>
+          <p:nvPr/>
+        </p:nvPicPr>
+        <p:blipFill>
+          <a:blip r:embed="rId2"/>
+          <a:stretch>
+            <a:fillRect/>
+          </a:stretch>
+        </p:blipFill>
+        <p:spPr>
+          <a:xfrm>
+            <a:off x="4182364" y="2132240"/>
+            <a:ext cx="4317252" cy="1736941"/>
+          </a:xfrm>
+          <a:prstGeom prst="rect">
+            <a:avLst/>
+          </a:prstGeom>
+        </p:spPr>
+      </p:pic>
+      <p:sp>
+        <p:nvSpPr>
+          <p:cNvPr id="6" name="TextBox 5">
+            <a:extLst>
+              <a:ext uri="{FF2B5EF4-FFF2-40B4-BE49-F238E27FC236}">
+                <a16:creationId xmlns:a16="http://schemas.microsoft.com/office/drawing/2014/main" id="{D2057CD9-A5B0-7F49-8598-0A7A95B3AB61}"/>
+              </a:ext>
+            </a:extLst>
+          </p:cNvPr>
+          <p:cNvSpPr txBox="1"/>
+          <p:nvPr/>
+        </p:nvSpPr>
+        <p:spPr>
+          <a:xfrm>
+            <a:off x="914400" y="2331720"/>
+            <a:ext cx="184731" cy="369332"/>
+          </a:xfrm>
+          <a:prstGeom prst="rect">
+            <a:avLst/>
+          </a:prstGeom>
+          <a:noFill/>
+        </p:spPr>
+        <p:txBody>
+          <a:bodyPr wrap="none" rtlCol="0">
+            <a:spAutoFit/>
+          </a:bodyPr>
+          <a:lstStyle/>
+          <a:p>
+            <a:endParaRPr lang="en-GB" dirty="0"/>
+          </a:p>
+        </p:txBody>
+      </p:sp>
+      <p:sp>
+        <p:nvSpPr>
+          <p:cNvPr id="9" name="Content Placeholder 2">
+            <a:extLst>
+              <a:ext uri="{FF2B5EF4-FFF2-40B4-BE49-F238E27FC236}">
+                <a16:creationId xmlns:a16="http://schemas.microsoft.com/office/drawing/2014/main" id="{8A4A607D-BBA9-0346-9082-0727D554BAF7}"/>
+              </a:ext>
+            </a:extLst>
+          </p:cNvPr>
+          <p:cNvSpPr>
+            <a:spLocks noGrp="1"/>
+          </p:cNvSpPr>
+          <p:nvPr>
+            <p:ph idx="1"/>
+          </p:nvPr>
+        </p:nvSpPr>
+        <p:spPr>
+          <a:xfrm>
+            <a:off x="457200" y="2346581"/>
+            <a:ext cx="8229600" cy="3644104"/>
+          </a:xfrm>
+        </p:spPr>
+        <p:txBody>
+          <a:bodyPr/>
+          <a:lstStyle/>
+          <a:p>
+            <a:r>
+              <a:rPr lang="en-US" dirty="0"/>
+              <a:t>Optimization level 0 &amp; 1</a:t>
+            </a:r>
+          </a:p>
+          <a:p>
+            <a:pPr lvl="1"/>
+            <a:r>
+              <a:rPr lang="en-GB" sz="1200" dirty="0">
+                <a:solidFill>
+                  <a:srgbClr val="00B050"/>
+                </a:solidFill>
+              </a:rPr>
+              <a:t>1.6557879224730601e19</a:t>
+            </a:r>
+          </a:p>
+          <a:p>
+            <a:pPr lvl="1"/>
+            <a:r>
+              <a:rPr lang="en-GB" sz="1200" dirty="0">
+                <a:solidFill>
+                  <a:srgbClr val="00B050"/>
+                </a:solidFill>
+              </a:rPr>
+              <a:t>1.65578792247306</a:t>
+            </a:r>
+            <a:r>
+              <a:rPr lang="en-GB" sz="1200" dirty="0">
+                <a:solidFill>
+                  <a:srgbClr val="FF0000"/>
+                </a:solidFill>
+              </a:rPr>
+              <a:t>18</a:t>
+            </a:r>
+          </a:p>
+          <a:p>
+            <a:pPr lvl="1"/>
+            <a:r>
+              <a:rPr lang="en-GB" sz="1200" dirty="0">
+                <a:solidFill>
+                  <a:srgbClr val="00B050"/>
+                </a:solidFill>
+              </a:rPr>
+              <a:t>1.6557879224730601e19</a:t>
+            </a:r>
+            <a:r>
+              <a:rPr lang="en-GB" sz="1200" dirty="0"/>
+              <a:t> (true)</a:t>
+            </a:r>
+          </a:p>
+          <a:p>
+            <a:pPr lvl="1"/>
+            <a:r>
+              <a:rPr lang="en-GB" sz="1200" dirty="0">
+                <a:solidFill>
+                  <a:srgbClr val="00B050"/>
+                </a:solidFill>
+              </a:rPr>
+              <a:t>3.5055647058823527</a:t>
+            </a:r>
+          </a:p>
+          <a:p>
+            <a:pPr lvl="1"/>
+            <a:r>
+              <a:rPr lang="en-GB" sz="1200" dirty="0">
+                <a:solidFill>
+                  <a:srgbClr val="00B050"/>
+                </a:solidFill>
+              </a:rPr>
+              <a:t>3.5055647058823527</a:t>
+            </a:r>
+            <a:r>
+              <a:rPr lang="en-GB" sz="1200" dirty="0"/>
+              <a:t> (true)</a:t>
+            </a:r>
+            <a:endParaRPr lang="en-US" sz="1200" dirty="0"/>
+          </a:p>
+          <a:p>
+            <a:r>
+              <a:rPr lang="en-US" dirty="0"/>
+              <a:t>Optimization level 2 &amp; 3</a:t>
+            </a:r>
+          </a:p>
+          <a:p>
+            <a:pPr lvl="1"/>
+            <a:r>
+              <a:rPr lang="en-GB" sz="1200" dirty="0">
+                <a:solidFill>
+                  <a:srgbClr val="00B050"/>
+                </a:solidFill>
+              </a:rPr>
+              <a:t>1.65578792247306</a:t>
+            </a:r>
+            <a:r>
+              <a:rPr lang="en-GB" sz="1200" strike="sngStrike" dirty="0">
+                <a:solidFill>
+                  <a:srgbClr val="FF0000"/>
+                </a:solidFill>
+              </a:rPr>
+              <a:t>01</a:t>
+            </a:r>
+            <a:r>
+              <a:rPr lang="en-GB" sz="1200" dirty="0">
+                <a:solidFill>
+                  <a:srgbClr val="00B050"/>
+                </a:solidFill>
+              </a:rPr>
+              <a:t>e19</a:t>
+            </a:r>
+          </a:p>
+          <a:p>
+            <a:pPr lvl="1"/>
+            <a:r>
+              <a:rPr lang="en-GB" sz="1200" dirty="0">
+                <a:solidFill>
+                  <a:srgbClr val="00B050"/>
+                </a:solidFill>
+              </a:rPr>
+              <a:t>1.65578792247306</a:t>
+            </a:r>
+            <a:r>
+              <a:rPr lang="en-GB" sz="1200" dirty="0">
+                <a:solidFill>
+                  <a:srgbClr val="FF0000"/>
+                </a:solidFill>
+              </a:rPr>
+              <a:t>16</a:t>
+            </a:r>
+          </a:p>
+          <a:p>
+            <a:pPr lvl="1"/>
+            <a:r>
+              <a:rPr lang="en-GB" sz="1200" dirty="0">
+                <a:solidFill>
+                  <a:srgbClr val="00B050"/>
+                </a:solidFill>
+              </a:rPr>
+              <a:t>1.6557879224730601e19 </a:t>
+            </a:r>
+            <a:r>
+              <a:rPr lang="en-GB" sz="1200" dirty="0"/>
+              <a:t>(true)</a:t>
+            </a:r>
+          </a:p>
+          <a:p>
+            <a:pPr lvl="1"/>
+            <a:r>
+              <a:rPr lang="en-GB" sz="1200" dirty="0">
+                <a:solidFill>
+                  <a:srgbClr val="00B050"/>
+                </a:solidFill>
+              </a:rPr>
+              <a:t>3.50556470588235</a:t>
+            </a:r>
+            <a:r>
+              <a:rPr lang="en-GB" sz="1200" dirty="0">
+                <a:solidFill>
+                  <a:srgbClr val="FF0000"/>
+                </a:solidFill>
+              </a:rPr>
+              <a:t>3</a:t>
+            </a:r>
+          </a:p>
+          <a:p>
+            <a:pPr lvl="1"/>
+            <a:r>
+              <a:rPr lang="en-GB" sz="1200" dirty="0">
+                <a:solidFill>
+                  <a:srgbClr val="00B050"/>
+                </a:solidFill>
+              </a:rPr>
+              <a:t>3.5055647058823527 </a:t>
+            </a:r>
+            <a:r>
+              <a:rPr lang="en-GB" sz="1200" dirty="0"/>
+              <a:t>(true)</a:t>
             </a:r>
           </a:p>
         </p:txBody>

</xml_diff>